<commit_message>
Revert "New New Diapo"
This reverts commit 2565ea6194ffbb7f56be2739592ac2b115ff4769.
</commit_message>
<xml_diff>
--- a/Diapo Soutenance.pptx
+++ b/Diapo Soutenance.pptx
@@ -381,13 +381,13 @@
                 <c:formatCode>General</c:formatCode>
                 <c:ptCount val="3"/>
                 <c:pt idx="0">
-                  <c:v>3.9E-2</c:v>
+                  <c:v>1.4999999999999999E-2</c:v>
                 </c:pt>
                 <c:pt idx="1">
-                  <c:v>3.0190000000000001</c:v>
+                  <c:v>0.33300000000000002</c:v>
                 </c:pt>
                 <c:pt idx="2">
-                  <c:v>123.129</c:v>
+                  <c:v>2.8410000000000002</c:v>
                 </c:pt>
               </c:numCache>
             </c:numRef>
@@ -404,11 +404,11 @@
         </c:dLbls>
         <c:marker val="1"/>
         <c:smooth val="0"/>
-        <c:axId val="34358400"/>
-        <c:axId val="34360320"/>
+        <c:axId val="88185472"/>
+        <c:axId val="88204032"/>
       </c:lineChart>
       <c:catAx>
-        <c:axId val="34358400"/>
+        <c:axId val="88185472"/>
         <c:scaling>
           <c:orientation val="minMax"/>
         </c:scaling>
@@ -438,7 +438,7 @@
         <c:majorTickMark val="out"/>
         <c:minorTickMark val="none"/>
         <c:tickLblPos val="nextTo"/>
-        <c:crossAx val="34360320"/>
+        <c:crossAx val="88204032"/>
         <c:crosses val="autoZero"/>
         <c:auto val="1"/>
         <c:lblAlgn val="ctr"/>
@@ -446,10 +446,10 @@
         <c:noMultiLvlLbl val="0"/>
       </c:catAx>
       <c:valAx>
-        <c:axId val="34360320"/>
+        <c:axId val="88204032"/>
         <c:scaling>
           <c:orientation val="minMax"/>
-          <c:max val="200"/>
+          <c:max val="100"/>
           <c:min val="0"/>
         </c:scaling>
         <c:delete val="0"/>
@@ -483,7 +483,7 @@
         <c:majorTickMark val="out"/>
         <c:minorTickMark val="none"/>
         <c:tickLblPos val="nextTo"/>
-        <c:crossAx val="34358400"/>
+        <c:crossAx val="88185472"/>
         <c:crosses val="autoZero"/>
         <c:crossBetween val="between"/>
       </c:valAx>
@@ -602,10 +602,10 @@
                 <c:formatCode>General</c:formatCode>
                 <c:ptCount val="4"/>
                 <c:pt idx="0">
-                  <c:v>10</c:v>
+                  <c:v>16</c:v>
                 </c:pt>
                 <c:pt idx="1">
-                  <c:v>22</c:v>
+                  <c:v>36</c:v>
                 </c:pt>
                 <c:pt idx="2">
                   <c:v>64</c:v>
@@ -663,16 +663,16 @@
                 <c:formatCode>General</c:formatCode>
                 <c:ptCount val="4"/>
                 <c:pt idx="0">
-                  <c:v>16</c:v>
+                  <c:v>20</c:v>
                 </c:pt>
                 <c:pt idx="1">
-                  <c:v>8</c:v>
+                  <c:v>14</c:v>
                 </c:pt>
                 <c:pt idx="2">
-                  <c:v>6</c:v>
+                  <c:v>10</c:v>
                 </c:pt>
                 <c:pt idx="3">
-                  <c:v>4</c:v>
+                  <c:v>8</c:v>
                 </c:pt>
               </c:numCache>
             </c:numRef>
@@ -689,11 +689,11 @@
         </c:dLbls>
         <c:marker val="1"/>
         <c:smooth val="0"/>
-        <c:axId val="34900608"/>
-        <c:axId val="34902784"/>
+        <c:axId val="88256896"/>
+        <c:axId val="88258816"/>
       </c:lineChart>
       <c:catAx>
-        <c:axId val="34900608"/>
+        <c:axId val="88256896"/>
         <c:scaling>
           <c:orientation val="minMax"/>
         </c:scaling>
@@ -727,7 +727,7 @@
         <c:majorTickMark val="out"/>
         <c:minorTickMark val="none"/>
         <c:tickLblPos val="nextTo"/>
-        <c:crossAx val="34902784"/>
+        <c:crossAx val="88258816"/>
         <c:crosses val="autoZero"/>
         <c:auto val="1"/>
         <c:lblAlgn val="ctr"/>
@@ -735,7 +735,7 @@
         <c:noMultiLvlLbl val="0"/>
       </c:catAx>
       <c:valAx>
-        <c:axId val="34902784"/>
+        <c:axId val="88258816"/>
         <c:scaling>
           <c:orientation val="minMax"/>
         </c:scaling>
@@ -766,7 +766,7 @@
         <c:majorTickMark val="out"/>
         <c:minorTickMark val="none"/>
         <c:tickLblPos val="nextTo"/>
-        <c:crossAx val="34900608"/>
+        <c:crossAx val="88256896"/>
         <c:crosses val="autoZero"/>
         <c:crossBetween val="between"/>
       </c:valAx>
@@ -10137,7 +10137,7 @@
           <p:nvPr>
             <p:extLst>
               <p:ext uri="{D42A27DB-BD31-4B8C-83A1-F6EECF244321}">
-                <p14:modId xmlns:p14="http://schemas.microsoft.com/office/powerpoint/2010/main" val="1856068333"/>
+                <p14:modId xmlns:p14="http://schemas.microsoft.com/office/powerpoint/2010/main" val="3292704218"/>
               </p:ext>
             </p:extLst>
           </p:nvPr>
@@ -10550,7 +10550,7 @@
           <p:nvPr>
             <p:extLst>
               <p:ext uri="{D42A27DB-BD31-4B8C-83A1-F6EECF244321}">
-                <p14:modId xmlns:p14="http://schemas.microsoft.com/office/powerpoint/2010/main" val="3580421765"/>
+                <p14:modId xmlns:p14="http://schemas.microsoft.com/office/powerpoint/2010/main" val="2885524085"/>
               </p:ext>
             </p:extLst>
           </p:nvPr>
@@ -11733,11 +11733,11 @@
   <p:clrMapOvr>
     <a:masterClrMapping/>
   </p:clrMapOvr>
-  <mc:AlternateContent xmlns:mc="http://schemas.openxmlformats.org/markup-compatibility/2006" xmlns:p14="http://schemas.microsoft.com/office/powerpoint/2010/main">
-    <mc:Choice Requires="p14">
+  <mc:AlternateContent xmlns:mc="http://schemas.openxmlformats.org/markup-compatibility/2006">
+    <mc:Choice xmlns:p14="http://schemas.microsoft.com/office/powerpoint/2010/main" Requires="p14">
       <p:transition spd="slow" p14:dur="2000"/>
     </mc:Choice>
-    <mc:Fallback xmlns="">
+    <mc:Fallback>
       <p:transition spd="slow"/>
     </mc:Fallback>
   </mc:AlternateContent>

</xml_diff>